<commit_message>
agregando más criterios de nivel A
</commit_message>
<xml_diff>
--- a/NTS - Accesibilidad Web - P2 - SEPTIEMBRE 2024.pptx
+++ b/NTS - Accesibilidad Web - P2 - SEPTIEMBRE 2024.pptx
@@ -5,7 +5,7 @@
     <p:sldMasterId id="2147483660" r:id="rId1"/>
   </p:sldMasterIdLst>
   <p:notesMasterIdLst>
-    <p:notesMasterId r:id="rId23"/>
+    <p:notesMasterId r:id="rId24"/>
   </p:notesMasterIdLst>
   <p:sldIdLst>
     <p:sldId id="1275" r:id="rId2"/>
@@ -28,33 +28,34 @@
     <p:sldId id="298" r:id="rId19"/>
     <p:sldId id="299" r:id="rId20"/>
     <p:sldId id="300" r:id="rId21"/>
-    <p:sldId id="1276" r:id="rId22"/>
+    <p:sldId id="1293" r:id="rId22"/>
+    <p:sldId id="1276" r:id="rId23"/>
   </p:sldIdLst>
   <p:sldSz cx="9144000" cy="5143500" type="screen16x9"/>
   <p:notesSz cx="6858000" cy="9144000"/>
   <p:embeddedFontLst>
     <p:embeddedFont>
       <p:font typeface="Bembo Std" panose="02020605060306020A03" pitchFamily="18" charset="0"/>
-      <p:regular r:id="rId24"/>
+      <p:regular r:id="rId25"/>
     </p:embeddedFont>
     <p:embeddedFont>
       <p:font typeface="Open Sans Extrabold" panose="020B0906030804020204" pitchFamily="34" charset="0"/>
-      <p:bold r:id="rId25"/>
-      <p:boldItalic r:id="rId26"/>
+      <p:bold r:id="rId26"/>
+      <p:boldItalic r:id="rId27"/>
     </p:embeddedFont>
     <p:embeddedFont>
       <p:font typeface="Roboto" panose="02000000000000000000" pitchFamily="2" charset="0"/>
-      <p:regular r:id="rId27"/>
-      <p:bold r:id="rId28"/>
-      <p:italic r:id="rId29"/>
-      <p:boldItalic r:id="rId30"/>
+      <p:regular r:id="rId28"/>
+      <p:bold r:id="rId29"/>
+      <p:italic r:id="rId30"/>
+      <p:boldItalic r:id="rId31"/>
     </p:embeddedFont>
     <p:embeddedFont>
       <p:font typeface="Trebuchet MS" panose="020B0603020202020204" pitchFamily="34" charset="0"/>
-      <p:regular r:id="rId31"/>
-      <p:bold r:id="rId32"/>
-      <p:italic r:id="rId33"/>
-      <p:boldItalic r:id="rId34"/>
+      <p:regular r:id="rId32"/>
+      <p:bold r:id="rId33"/>
+      <p:italic r:id="rId34"/>
+      <p:boldItalic r:id="rId35"/>
     </p:embeddedFont>
   </p:embeddedFontLst>
   <p:defaultTextStyle>
@@ -2148,6 +2149,115 @@
   <p:cSld>
     <p:spTree>
       <p:nvGrpSpPr>
+        <p:cNvPr id="1" name="Shape 172"/>
+        <p:cNvGrpSpPr/>
+        <p:nvPr/>
+      </p:nvGrpSpPr>
+      <p:grpSpPr>
+        <a:xfrm>
+          <a:off x="0" y="0"/>
+          <a:ext cx="0" cy="0"/>
+          <a:chOff x="0" y="0"/>
+          <a:chExt cx="0" cy="0"/>
+        </a:xfrm>
+      </p:grpSpPr>
+      <p:sp>
+        <p:nvSpPr>
+          <p:cNvPr id="173" name="Google Shape;173;g2ef5e8caf32_0_38:notes"/>
+          <p:cNvSpPr>
+            <a:spLocks noGrp="1" noRot="1" noChangeAspect="1"/>
+          </p:cNvSpPr>
+          <p:nvPr>
+            <p:ph type="sldImg" idx="2"/>
+          </p:nvPr>
+        </p:nvSpPr>
+        <p:spPr>
+          <a:xfrm>
+            <a:off x="381000" y="685800"/>
+            <a:ext cx="6096000" cy="3429000"/>
+          </a:xfrm>
+          <a:custGeom>
+            <a:avLst/>
+            <a:gdLst/>
+            <a:ahLst/>
+            <a:cxnLst/>
+            <a:rect l="l" t="t" r="r" b="b"/>
+            <a:pathLst>
+              <a:path w="120000" h="120000" extrusionOk="0">
+                <a:moveTo>
+                  <a:pt x="0" y="0"/>
+                </a:moveTo>
+                <a:lnTo>
+                  <a:pt x="120000" y="0"/>
+                </a:lnTo>
+                <a:lnTo>
+                  <a:pt x="120000" y="120000"/>
+                </a:lnTo>
+                <a:lnTo>
+                  <a:pt x="0" y="120000"/>
+                </a:lnTo>
+                <a:close/>
+              </a:path>
+            </a:pathLst>
+          </a:custGeom>
+        </p:spPr>
+      </p:sp>
+      <p:sp>
+        <p:nvSpPr>
+          <p:cNvPr id="174" name="Google Shape;174;g2ef5e8caf32_0_38:notes"/>
+          <p:cNvSpPr txBox="1">
+            <a:spLocks noGrp="1"/>
+          </p:cNvSpPr>
+          <p:nvPr>
+            <p:ph type="body" idx="1"/>
+          </p:nvPr>
+        </p:nvSpPr>
+        <p:spPr>
+          <a:xfrm>
+            <a:off x="685800" y="4343400"/>
+            <a:ext cx="5486400" cy="4114800"/>
+          </a:xfrm>
+          <a:prstGeom prst="rect">
+            <a:avLst/>
+          </a:prstGeom>
+        </p:spPr>
+        <p:txBody>
+          <a:bodyPr spcFirstLastPara="1" wrap="square" lIns="91425" tIns="91425" rIns="91425" bIns="91425" anchor="t" anchorCtr="0">
+            <a:noAutofit/>
+          </a:bodyPr>
+          <a:lstStyle/>
+          <a:p>
+            <a:pPr marL="0" lvl="0" indent="0" algn="l" rtl="0">
+              <a:spcBef>
+                <a:spcPts val="0"/>
+              </a:spcBef>
+              <a:spcAft>
+                <a:spcPts val="0"/>
+              </a:spcAft>
+              <a:buNone/>
+            </a:pPr>
+            <a:endParaRPr/>
+          </a:p>
+        </p:txBody>
+      </p:sp>
+    </p:spTree>
+    <p:extLst>
+      <p:ext uri="{BB962C8B-B14F-4D97-AF65-F5344CB8AC3E}">
+        <p14:creationId xmlns:p14="http://schemas.microsoft.com/office/powerpoint/2010/main" val="1411837830"/>
+      </p:ext>
+    </p:extLst>
+  </p:cSld>
+  <p:clrMapOvr>
+    <a:masterClrMapping/>
+  </p:clrMapOvr>
+</p:notes>
+</file>
+
+<file path=ppt/notesSlides/notesSlide22.xml><?xml version="1.0" encoding="utf-8"?>
+<p:notes xmlns:a="http://schemas.openxmlformats.org/drawingml/2006/main" xmlns:r="http://schemas.openxmlformats.org/officeDocument/2006/relationships" xmlns:p="http://schemas.openxmlformats.org/presentationml/2006/main" showMasterSp="0" showMasterPhAnim="0">
+  <p:cSld>
+    <p:spTree>
+      <p:nvGrpSpPr>
         <p:cNvPr id="1" name="Shape 665"/>
         <p:cNvGrpSpPr/>
         <p:nvPr/>
@@ -3788,7 +3898,7 @@
           <a:p>
             <a:fld id="{EDB770E0-B254-46C6-80BD-AA41F988AA15}" type="datetimeFigureOut">
               <a:rPr lang="es-SV" smtClean="0"/>
-              <a:t>2/9/2024</a:t>
+              <a:t>4/9/2024</a:t>
             </a:fld>
             <a:endParaRPr lang="es-SV" dirty="0"/>
           </a:p>
@@ -15350,6 +15460,206 @@
   <p:cSld>
     <p:spTree>
       <p:nvGrpSpPr>
+        <p:cNvPr id="1" name="Shape 175"/>
+        <p:cNvGrpSpPr/>
+        <p:nvPr/>
+      </p:nvGrpSpPr>
+      <p:grpSpPr>
+        <a:xfrm>
+          <a:off x="0" y="0"/>
+          <a:ext cx="0" cy="0"/>
+          <a:chOff x="0" y="0"/>
+          <a:chExt cx="0" cy="0"/>
+        </a:xfrm>
+      </p:grpSpPr>
+      <p:sp>
+        <p:nvSpPr>
+          <p:cNvPr id="176" name="Google Shape;176;p22"/>
+          <p:cNvSpPr txBox="1">
+            <a:spLocks noGrp="1"/>
+          </p:cNvSpPr>
+          <p:nvPr>
+            <p:ph type="title" idx="4294967295"/>
+          </p:nvPr>
+        </p:nvSpPr>
+        <p:spPr>
+          <a:xfrm>
+            <a:off x="500856" y="761648"/>
+            <a:ext cx="8142287" cy="838200"/>
+          </a:xfrm>
+          <a:prstGeom prst="rect">
+            <a:avLst/>
+          </a:prstGeom>
+        </p:spPr>
+        <p:txBody>
+          <a:bodyPr spcFirstLastPara="1" wrap="square" lIns="91425" tIns="91425" rIns="91425" bIns="91425" anchor="ctr" anchorCtr="0">
+            <a:noAutofit/>
+          </a:bodyPr>
+          <a:lstStyle/>
+          <a:p>
+            <a:pPr marL="0" lvl="0" indent="0" algn="ctr" rtl="0">
+              <a:spcBef>
+                <a:spcPts val="0"/>
+              </a:spcBef>
+              <a:spcAft>
+                <a:spcPts val="0"/>
+              </a:spcAft>
+              <a:buNone/>
+            </a:pPr>
+            <a:r>
+              <a:rPr lang="es-SV" sz="4800" b="1" dirty="0">
+                <a:solidFill>
+                  <a:srgbClr val="1F3864"/>
+                </a:solidFill>
+                <a:latin typeface="Trebuchet MS" panose="020B0603020202020204" pitchFamily="34" charset="0"/>
+              </a:rPr>
+              <a:t>Espacio para preguntas</a:t>
+            </a:r>
+            <a:endParaRPr sz="4800" b="1" dirty="0">
+              <a:solidFill>
+                <a:srgbClr val="1F3864"/>
+              </a:solidFill>
+              <a:latin typeface="Trebuchet MS" panose="020B0603020202020204" pitchFamily="34" charset="0"/>
+            </a:endParaRPr>
+          </a:p>
+        </p:txBody>
+      </p:sp>
+      <p:pic>
+        <p:nvPicPr>
+          <p:cNvPr id="2" name="Google Shape;93;p2">
+            <a:extLst>
+              <a:ext uri="{FF2B5EF4-FFF2-40B4-BE49-F238E27FC236}">
+                <a16:creationId xmlns:a16="http://schemas.microsoft.com/office/drawing/2014/main" id="{488B9BCC-CC22-5E08-7A76-B3D426638AC0}"/>
+              </a:ext>
+            </a:extLst>
+          </p:cNvPr>
+          <p:cNvPicPr preferRelativeResize="0"/>
+          <p:nvPr/>
+        </p:nvPicPr>
+        <p:blipFill rotWithShape="1">
+          <a:blip r:embed="rId3">
+            <a:alphaModFix/>
+          </a:blip>
+          <a:srcRect/>
+          <a:stretch/>
+        </p:blipFill>
+        <p:spPr>
+          <a:xfrm>
+            <a:off x="8543925" y="4607719"/>
+            <a:ext cx="600075" cy="535781"/>
+          </a:xfrm>
+          <a:prstGeom prst="rect">
+            <a:avLst/>
+          </a:prstGeom>
+          <a:noFill/>
+          <a:ln>
+            <a:noFill/>
+          </a:ln>
+        </p:spPr>
+      </p:pic>
+      <p:pic>
+        <p:nvPicPr>
+          <p:cNvPr id="3" name="Google Shape;94;p2">
+            <a:extLst>
+              <a:ext uri="{FF2B5EF4-FFF2-40B4-BE49-F238E27FC236}">
+                <a16:creationId xmlns:a16="http://schemas.microsoft.com/office/drawing/2014/main" id="{404E19A7-41E2-98B9-2A18-49458F245517}"/>
+              </a:ext>
+            </a:extLst>
+          </p:cNvPr>
+          <p:cNvPicPr preferRelativeResize="0"/>
+          <p:nvPr/>
+        </p:nvPicPr>
+        <p:blipFill rotWithShape="1">
+          <a:blip r:embed="rId4">
+            <a:alphaModFix/>
+          </a:blip>
+          <a:srcRect/>
+          <a:stretch/>
+        </p:blipFill>
+        <p:spPr>
+          <a:xfrm>
+            <a:off x="229555" y="4464747"/>
+            <a:ext cx="1083942" cy="535782"/>
+          </a:xfrm>
+          <a:prstGeom prst="rect">
+            <a:avLst/>
+          </a:prstGeom>
+          <a:noFill/>
+          <a:ln>
+            <a:noFill/>
+          </a:ln>
+        </p:spPr>
+      </p:pic>
+      <p:pic>
+        <p:nvPicPr>
+          <p:cNvPr id="1026" name="Picture 2" descr="Qué preguntas hacer en un cuestionario? - Eval&amp;GO">
+            <a:extLst>
+              <a:ext uri="{FF2B5EF4-FFF2-40B4-BE49-F238E27FC236}">
+                <a16:creationId xmlns:a16="http://schemas.microsoft.com/office/drawing/2014/main" id="{9A48FA0A-391C-F977-7FD2-FCF2533057FA}"/>
+              </a:ext>
+            </a:extLst>
+          </p:cNvPr>
+          <p:cNvPicPr>
+            <a:picLocks noChangeAspect="1" noChangeArrowheads="1"/>
+          </p:cNvPicPr>
+          <p:nvPr/>
+        </p:nvPicPr>
+        <p:blipFill>
+          <a:blip r:embed="rId5">
+            <a:extLst>
+              <a:ext uri="{28A0092B-C50C-407E-A947-70E740481C1C}">
+                <a14:useLocalDpi xmlns:a14="http://schemas.microsoft.com/office/drawing/2010/main" val="0"/>
+              </a:ext>
+            </a:extLst>
+          </a:blip>
+          <a:srcRect/>
+          <a:stretch>
+            <a:fillRect/>
+          </a:stretch>
+        </p:blipFill>
+        <p:spPr bwMode="auto">
+          <a:xfrm>
+            <a:off x="2350073" y="1927225"/>
+            <a:ext cx="4443853" cy="2965619"/>
+          </a:xfrm>
+          <a:prstGeom prst="ellipse">
+            <a:avLst/>
+          </a:prstGeom>
+          <a:ln>
+            <a:noFill/>
+          </a:ln>
+          <a:effectLst>
+            <a:softEdge rad="112500"/>
+          </a:effectLst>
+          <a:extLst>
+            <a:ext uri="{909E8E84-426E-40DD-AFC4-6F175D3DCCD1}">
+              <a14:hiddenFill xmlns:a14="http://schemas.microsoft.com/office/drawing/2010/main">
+                <a:solidFill>
+                  <a:srgbClr val="FFFFFF"/>
+                </a:solidFill>
+              </a14:hiddenFill>
+            </a:ext>
+          </a:extLst>
+        </p:spPr>
+      </p:pic>
+    </p:spTree>
+    <p:extLst>
+      <p:ext uri="{BB962C8B-B14F-4D97-AF65-F5344CB8AC3E}">
+        <p14:creationId xmlns:p14="http://schemas.microsoft.com/office/powerpoint/2010/main" val="175905444"/>
+      </p:ext>
+    </p:extLst>
+  </p:cSld>
+  <p:clrMapOvr>
+    <a:masterClrMapping/>
+  </p:clrMapOvr>
+</p:sld>
+</file>
+
+<file path=ppt/slides/slide22.xml><?xml version="1.0" encoding="utf-8"?>
+<p:sld xmlns:a="http://schemas.openxmlformats.org/drawingml/2006/main" xmlns:r="http://schemas.openxmlformats.org/officeDocument/2006/relationships" xmlns:p="http://schemas.openxmlformats.org/presentationml/2006/main">
+  <p:cSld>
+    <p:spTree>
+      <p:nvGrpSpPr>
         <p:cNvPr id="1" name="Shape 668"/>
         <p:cNvGrpSpPr/>
         <p:nvPr/>

</xml_diff>